<commit_message>
Final changes in ppt and notebook
</commit_message>
<xml_diff>
--- a/final/Capstone Project - AIML Online.pptx
+++ b/final/Capstone Project - AIML Online.pptx
@@ -19504,7 +19504,7 @@
         <p:spPr>
           <a:xfrm>
             <a:off x="451282" y="342193"/>
-            <a:ext cx="11238969" cy="6063198"/>
+            <a:ext cx="11238900" cy="4894800"/>
           </a:xfrm>
           <a:prstGeom prst="rect">
             <a:avLst/>
@@ -19677,7 +19677,31 @@
                 <a:cs typeface="Calibri"/>
                 <a:sym typeface="Calibri"/>
               </a:rPr>
-              <a:t>On the basis of better precision, recall and accuracy the two model’s Bidirectional LSTM and Fast-Text are used to further improve the Accuracy by applying hyper parameter tuning that finally shows the accuracy for Bidirectional LSTM as </a:t>
+              <a:t>On the basis of better precision, recall and accuracy the </a:t>
+            </a:r>
+            <a:r>
+              <a:rPr lang="en-IN" sz="1900">
+                <a:solidFill>
+                  <a:schemeClr val="dk1"/>
+                </a:solidFill>
+                <a:latin typeface="Calibri"/>
+                <a:ea typeface="Calibri"/>
+                <a:cs typeface="Calibri"/>
+                <a:sym typeface="Calibri"/>
+              </a:rPr>
+              <a:t>two </a:t>
+            </a:r>
+            <a:r>
+              <a:rPr lang="en-IN" sz="1900">
+                <a:solidFill>
+                  <a:schemeClr val="dk1"/>
+                </a:solidFill>
+                <a:latin typeface="Calibri"/>
+                <a:ea typeface="Calibri"/>
+                <a:cs typeface="Calibri"/>
+                <a:sym typeface="Calibri"/>
+              </a:rPr>
+              <a:t>model’s Bidirectional LSTM and Fast-Text are used to further improve the Accuracy by applying hyper parameter tuning that finally shows the accuracy for Bidirectional LSTM as </a:t>
             </a:r>
             <a:r>
               <a:rPr b="1" lang="en-IN" sz="1900">
@@ -19689,7 +19713,19 @@
                 <a:cs typeface="Calibri"/>
                 <a:sym typeface="Calibri"/>
               </a:rPr>
-              <a:t>96.5 %</a:t>
+              <a:t>80 </a:t>
+            </a:r>
+            <a:r>
+              <a:rPr b="1" lang="en-IN" sz="1900">
+                <a:solidFill>
+                  <a:schemeClr val="dk1"/>
+                </a:solidFill>
+                <a:latin typeface="Calibri"/>
+                <a:ea typeface="Calibri"/>
+                <a:cs typeface="Calibri"/>
+                <a:sym typeface="Calibri"/>
+              </a:rPr>
+              <a:t> %</a:t>
             </a:r>
             <a:r>
               <a:rPr lang="en-IN" sz="1900">
@@ -19701,7 +19737,19 @@
                 <a:cs typeface="Calibri"/>
                 <a:sym typeface="Calibri"/>
               </a:rPr>
-              <a:t> and Fast-Text as </a:t>
+              <a:t> </a:t>
+            </a:r>
+            <a:r>
+              <a:rPr lang="en-IN" sz="1900">
+                <a:solidFill>
+                  <a:schemeClr val="dk1"/>
+                </a:solidFill>
+                <a:latin typeface="Calibri"/>
+                <a:ea typeface="Calibri"/>
+                <a:cs typeface="Calibri"/>
+                <a:sym typeface="Calibri"/>
+              </a:rPr>
+              <a:t>and Fast-Text as </a:t>
             </a:r>
             <a:r>
               <a:rPr b="1" lang="en-IN" sz="1900">
@@ -19713,7 +19761,7 @@
                 <a:cs typeface="Calibri"/>
                 <a:sym typeface="Calibri"/>
               </a:rPr>
-              <a:t>90.4 %.</a:t>
+              <a:t>80 %.</a:t>
             </a:r>
             <a:endParaRPr sz="1900">
               <a:solidFill>
@@ -19746,133 +19794,6 @@
                 <a:sym typeface="Calibri"/>
               </a:rPr>
             </a:br>
-            <a:r>
-              <a:rPr lang="en-IN" sz="1900">
-                <a:solidFill>
-                  <a:schemeClr val="dk1"/>
-                </a:solidFill>
-                <a:latin typeface="Calibri"/>
-                <a:ea typeface="Calibri"/>
-                <a:cs typeface="Calibri"/>
-                <a:sym typeface="Calibri"/>
-              </a:rPr>
-              <a:t>Therefore, Our Automatic Ticket Assignment system has error rate of less than </a:t>
-            </a:r>
-            <a:r>
-              <a:rPr b="1" lang="en-IN" sz="1900">
-                <a:solidFill>
-                  <a:schemeClr val="dk1"/>
-                </a:solidFill>
-                <a:latin typeface="Calibri"/>
-                <a:ea typeface="Calibri"/>
-                <a:cs typeface="Calibri"/>
-                <a:sym typeface="Calibri"/>
-              </a:rPr>
-              <a:t>5 %</a:t>
-            </a:r>
-            <a:r>
-              <a:rPr lang="en-IN" sz="1900">
-                <a:solidFill>
-                  <a:schemeClr val="dk1"/>
-                </a:solidFill>
-                <a:latin typeface="Calibri"/>
-                <a:ea typeface="Calibri"/>
-                <a:cs typeface="Calibri"/>
-                <a:sym typeface="Calibri"/>
-              </a:rPr>
-              <a:t> which is far the less compared to the existing error rate of </a:t>
-            </a:r>
-            <a:r>
-              <a:rPr b="1" lang="en-IN" sz="1900">
-                <a:solidFill>
-                  <a:schemeClr val="dk1"/>
-                </a:solidFill>
-                <a:latin typeface="Calibri"/>
-                <a:ea typeface="Calibri"/>
-                <a:cs typeface="Calibri"/>
-                <a:sym typeface="Calibri"/>
-              </a:rPr>
-              <a:t>25%</a:t>
-            </a:r>
-            <a:r>
-              <a:rPr lang="en-IN" sz="1900">
-                <a:solidFill>
-                  <a:schemeClr val="dk1"/>
-                </a:solidFill>
-                <a:latin typeface="Calibri"/>
-                <a:ea typeface="Calibri"/>
-                <a:cs typeface="Calibri"/>
-                <a:sym typeface="Calibri"/>
-              </a:rPr>
-              <a:t>.</a:t>
-            </a:r>
-            <a:endParaRPr sz="1900">
-              <a:solidFill>
-                <a:schemeClr val="dk1"/>
-              </a:solidFill>
-              <a:latin typeface="Calibri"/>
-              <a:ea typeface="Calibri"/>
-              <a:cs typeface="Calibri"/>
-              <a:sym typeface="Calibri"/>
-            </a:endParaRPr>
-          </a:p>
-          <a:p>
-            <a:pPr indent="0" lvl="0" marL="0" marR="0" rtl="0" algn="l">
-              <a:spcBef>
-                <a:spcPts val="0"/>
-              </a:spcBef>
-              <a:spcAft>
-                <a:spcPts val="0"/>
-              </a:spcAft>
-              <a:buNone/>
-            </a:pPr>
-            <a:br>
-              <a:rPr lang="en-IN" sz="1900">
-                <a:solidFill>
-                  <a:schemeClr val="dk1"/>
-                </a:solidFill>
-                <a:latin typeface="Calibri"/>
-                <a:ea typeface="Calibri"/>
-                <a:cs typeface="Calibri"/>
-                <a:sym typeface="Calibri"/>
-              </a:rPr>
-            </a:br>
-            <a:r>
-              <a:rPr lang="en-IN" sz="1900">
-                <a:solidFill>
-                  <a:schemeClr val="dk1"/>
-                </a:solidFill>
-                <a:latin typeface="Calibri"/>
-                <a:ea typeface="Calibri"/>
-                <a:cs typeface="Calibri"/>
-                <a:sym typeface="Calibri"/>
-              </a:rPr>
-              <a:t>Thus, the level of confidence is</a:t>
-            </a:r>
-            <a:r>
-              <a:rPr b="1" lang="en-IN" sz="1900">
-                <a:solidFill>
-                  <a:schemeClr val="dk1"/>
-                </a:solidFill>
-                <a:latin typeface="Calibri"/>
-                <a:ea typeface="Calibri"/>
-                <a:cs typeface="Calibri"/>
-                <a:sym typeface="Calibri"/>
-              </a:rPr>
-              <a:t> 96.5 %</a:t>
-            </a:r>
-            <a:r>
-              <a:rPr lang="en-IN" sz="1900">
-                <a:solidFill>
-                  <a:schemeClr val="dk1"/>
-                </a:solidFill>
-                <a:latin typeface="Calibri"/>
-                <a:ea typeface="Calibri"/>
-                <a:cs typeface="Calibri"/>
-                <a:sym typeface="Calibri"/>
-              </a:rPr>
-              <a:t> and the model eradicates manual intervention of assigning the tickets to respective groups.</a:t>
-            </a:r>
             <a:endParaRPr sz="1900">
               <a:solidFill>
                 <a:schemeClr val="dk1"/>

</xml_diff>